<commit_message>
making changes to YT template
</commit_message>
<xml_diff>
--- a/youtube_template.pptx
+++ b/youtube_template.pptx
@@ -3888,9 +3888,14 @@
           <a:lstStyle/>
           <a:p>
             <a:r>
+              <a:rPr lang="en-US" dirty="0"/>
+              <a:t>Major Trending YouTube Videos </a:t>
+            </a:r>
+            <a:r>
               <a:rPr lang="en-US"/>
-              <a:t>YouTube PowerPoint Template Slide</a:t>
+              <a:t>by Country</a:t>
             </a:r>
+            <a:endParaRPr lang="en-US" dirty="0"/>
           </a:p>
         </p:txBody>
       </p:sp>
@@ -4195,8 +4200,8 @@
         </p:nvSpPr>
         <p:spPr>
           <a:xfrm>
-            <a:off x="7132725" y="1736109"/>
-            <a:ext cx="3275833" cy="707886"/>
+            <a:off x="7708589" y="1736109"/>
+            <a:ext cx="2124108" cy="707886"/>
           </a:xfrm>
           <a:prstGeom prst="rect">
             <a:avLst/>
@@ -4215,7 +4220,7 @@
                   <a:schemeClr val="bg1"/>
                 </a:solidFill>
               </a:rPr>
-              <a:t>Lorem Ipsum</a:t>
+              <a:t>Group 2</a:t>
             </a:r>
           </a:p>
         </p:txBody>

</xml_diff>